<commit_message>
Deployed 641336a with MkDocs version: 1.5.3
</commit_message>
<xml_diff>
--- a/resources/graficosBD.pptx
+++ b/resources/graficosBD.pptx
@@ -6,6 +6,7 @@
   </p:sldMasterIdLst>
   <p:sldIdLst>
     <p:sldId id="256" r:id="rId2"/>
+    <p:sldId id="257" r:id="rId3"/>
   </p:sldIdLst>
   <p:sldSz cx="12192000" cy="6858000"/>
   <p:notesSz cx="6858000" cy="9144000"/>
@@ -104,15 +105,161 @@
       </a:defRPr>
     </a:lvl9pPr>
   </p:defaultTextStyle>
+  <p:extLst>
+    <p:ext uri="{EFAFB233-063F-42B5-8137-9DF3F51BA10A}">
+      <p15:sldGuideLst xmlns:p15="http://schemas.microsoft.com/office/powerpoint/2012/main"/>
+    </p:ext>
+  </p:extLst>
 </p:presentation>
 </file>
 
 <file path=ppt/revisionInfo.xml><?xml version="1.0" encoding="utf-8"?>
 <p1510:revInfo xmlns:a="http://schemas.openxmlformats.org/drawingml/2006/main" xmlns:r="http://schemas.openxmlformats.org/officeDocument/2006/relationships" xmlns:p1510="http://schemas.microsoft.com/office/powerpoint/2015/10/main">
   <p1510:revLst>
-    <p1510:client id="{1C1A9418-01FF-EB43-B3B1-3FA2F3B7AF27}" v="8" dt="2024-08-06T09:04:31.837"/>
+    <p1510:client id="{75DD5463-8147-4F71-B6BC-989CA61CC403}" v="87" dt="2024-08-08T18:48:22.475"/>
   </p1510:revLst>
 </p1510:revInfo>
+</file>
+
+<file path=ppt/changesInfos/changesInfo1.xml><?xml version="1.0" encoding="utf-8"?>
+<pc:chgInfo xmlns:a="http://schemas.openxmlformats.org/drawingml/2006/main" xmlns:r="http://schemas.openxmlformats.org/officeDocument/2006/relationships" xmlns:ac="http://schemas.microsoft.com/office/drawing/2013/main/command" xmlns:pc="http://schemas.microsoft.com/office/powerpoint/2013/main/command">
+  <pc:docChgLst>
+    <pc:chgData name="MEDRANO ESCRIG, AITOR" userId="0d3502aa-7666-4142-bea3-4e942ac6c91d" providerId="ADAL" clId="{75DD5463-8147-4F71-B6BC-989CA61CC403}"/>
+    <pc:docChg chg="custSel addSld modSld">
+      <pc:chgData name="MEDRANO ESCRIG, AITOR" userId="0d3502aa-7666-4142-bea3-4e942ac6c91d" providerId="ADAL" clId="{75DD5463-8147-4F71-B6BC-989CA61CC403}" dt="2024-08-08T18:48:22.475" v="86" actId="478"/>
+      <pc:docMkLst>
+        <pc:docMk/>
+      </pc:docMkLst>
+      <pc:sldChg chg="addSp delSp modSp add mod">
+        <pc:chgData name="MEDRANO ESCRIG, AITOR" userId="0d3502aa-7666-4142-bea3-4e942ac6c91d" providerId="ADAL" clId="{75DD5463-8147-4F71-B6BC-989CA61CC403}" dt="2024-08-08T18:48:22.475" v="86" actId="478"/>
+        <pc:sldMkLst>
+          <pc:docMk/>
+          <pc:sldMk cId="1153971177" sldId="257"/>
+        </pc:sldMkLst>
+        <pc:spChg chg="mod">
+          <ac:chgData name="MEDRANO ESCRIG, AITOR" userId="0d3502aa-7666-4142-bea3-4e942ac6c91d" providerId="ADAL" clId="{75DD5463-8147-4F71-B6BC-989CA61CC403}" dt="2024-08-08T18:46:30.012" v="73" actId="20577"/>
+          <ac:spMkLst>
+            <pc:docMk/>
+            <pc:sldMk cId="1153971177" sldId="257"/>
+            <ac:spMk id="5" creationId="{AA461F6F-3B2E-CD78-6478-868EAC0898F2}"/>
+          </ac:spMkLst>
+        </pc:spChg>
+        <pc:spChg chg="del">
+          <ac:chgData name="MEDRANO ESCRIG, AITOR" userId="0d3502aa-7666-4142-bea3-4e942ac6c91d" providerId="ADAL" clId="{75DD5463-8147-4F71-B6BC-989CA61CC403}" dt="2024-08-08T18:48:22.475" v="86" actId="478"/>
+          <ac:spMkLst>
+            <pc:docMk/>
+            <pc:sldMk cId="1153971177" sldId="257"/>
+            <ac:spMk id="23" creationId="{8B8BF032-BE9E-0BF7-013A-44C21EA7DA85}"/>
+          </ac:spMkLst>
+        </pc:spChg>
+        <pc:spChg chg="del">
+          <ac:chgData name="MEDRANO ESCRIG, AITOR" userId="0d3502aa-7666-4142-bea3-4e942ac6c91d" providerId="ADAL" clId="{75DD5463-8147-4F71-B6BC-989CA61CC403}" dt="2024-08-08T18:48:20.597" v="85" actId="478"/>
+          <ac:spMkLst>
+            <pc:docMk/>
+            <pc:sldMk cId="1153971177" sldId="257"/>
+            <ac:spMk id="24" creationId="{4AEF133D-4A4B-7B95-3536-EBA491AE30BB}"/>
+          </ac:spMkLst>
+        </pc:spChg>
+        <pc:cxnChg chg="mod">
+          <ac:chgData name="MEDRANO ESCRIG, AITOR" userId="0d3502aa-7666-4142-bea3-4e942ac6c91d" providerId="ADAL" clId="{75DD5463-8147-4F71-B6BC-989CA61CC403}" dt="2024-08-08T18:46:37.350" v="74" actId="14100"/>
+          <ac:cxnSpMkLst>
+            <pc:docMk/>
+            <pc:sldMk cId="1153971177" sldId="257"/>
+            <ac:cxnSpMk id="7" creationId="{F4E49F37-9A66-5295-C6EA-FE3DE78A0CF3}"/>
+          </ac:cxnSpMkLst>
+        </pc:cxnChg>
+        <pc:cxnChg chg="mod">
+          <ac:chgData name="MEDRANO ESCRIG, AITOR" userId="0d3502aa-7666-4142-bea3-4e942ac6c91d" providerId="ADAL" clId="{75DD5463-8147-4F71-B6BC-989CA61CC403}" dt="2024-08-08T18:46:46.905" v="78" actId="14100"/>
+          <ac:cxnSpMkLst>
+            <pc:docMk/>
+            <pc:sldMk cId="1153971177" sldId="257"/>
+            <ac:cxnSpMk id="8" creationId="{EE24E5A2-AA3A-3645-7E1E-979644CE7DF4}"/>
+          </ac:cxnSpMkLst>
+        </pc:cxnChg>
+        <pc:cxnChg chg="add mod">
+          <ac:chgData name="MEDRANO ESCRIG, AITOR" userId="0d3502aa-7666-4142-bea3-4e942ac6c91d" providerId="ADAL" clId="{75DD5463-8147-4F71-B6BC-989CA61CC403}" dt="2024-08-08T18:46:59.578" v="81" actId="14100"/>
+          <ac:cxnSpMkLst>
+            <pc:docMk/>
+            <pc:sldMk cId="1153971177" sldId="257"/>
+            <ac:cxnSpMk id="11" creationId="{E86BBA03-3147-0FEF-7C39-7928AF905B3B}"/>
+          </ac:cxnSpMkLst>
+        </pc:cxnChg>
+        <pc:cxnChg chg="mod">
+          <ac:chgData name="MEDRANO ESCRIG, AITOR" userId="0d3502aa-7666-4142-bea3-4e942ac6c91d" providerId="ADAL" clId="{75DD5463-8147-4F71-B6BC-989CA61CC403}" dt="2024-08-08T18:46:44.436" v="77" actId="14100"/>
+          <ac:cxnSpMkLst>
+            <pc:docMk/>
+            <pc:sldMk cId="1153971177" sldId="257"/>
+            <ac:cxnSpMk id="13" creationId="{9DA8E11B-06D9-C5A5-0417-AB8AD906CB12}"/>
+          </ac:cxnSpMkLst>
+        </pc:cxnChg>
+        <pc:cxnChg chg="add mod">
+          <ac:chgData name="MEDRANO ESCRIG, AITOR" userId="0d3502aa-7666-4142-bea3-4e942ac6c91d" providerId="ADAL" clId="{75DD5463-8147-4F71-B6BC-989CA61CC403}" dt="2024-08-08T18:47:10.703" v="84" actId="14100"/>
+          <ac:cxnSpMkLst>
+            <pc:docMk/>
+            <pc:sldMk cId="1153971177" sldId="257"/>
+            <ac:cxnSpMk id="15" creationId="{D5A244D7-621E-8DEA-5390-5E69E3A51E7F}"/>
+          </ac:cxnSpMkLst>
+        </pc:cxnChg>
+        <pc:cxnChg chg="mod">
+          <ac:chgData name="MEDRANO ESCRIG, AITOR" userId="0d3502aa-7666-4142-bea3-4e942ac6c91d" providerId="ADAL" clId="{75DD5463-8147-4F71-B6BC-989CA61CC403}" dt="2024-08-08T18:46:40.005" v="75" actId="14100"/>
+          <ac:cxnSpMkLst>
+            <pc:docMk/>
+            <pc:sldMk cId="1153971177" sldId="257"/>
+            <ac:cxnSpMk id="16" creationId="{C68A7CF0-428A-404D-809B-6E419B0AE241}"/>
+          </ac:cxnSpMkLst>
+        </pc:cxnChg>
+        <pc:cxnChg chg="mod">
+          <ac:chgData name="MEDRANO ESCRIG, AITOR" userId="0d3502aa-7666-4142-bea3-4e942ac6c91d" providerId="ADAL" clId="{75DD5463-8147-4F71-B6BC-989CA61CC403}" dt="2024-08-08T18:46:42.581" v="76" actId="14100"/>
+          <ac:cxnSpMkLst>
+            <pc:docMk/>
+            <pc:sldMk cId="1153971177" sldId="257"/>
+            <ac:cxnSpMk id="20" creationId="{40D67917-38FA-9550-391B-FA92B7DD0417}"/>
+          </ac:cxnSpMkLst>
+        </pc:cxnChg>
+        <pc:cxnChg chg="del">
+          <ac:chgData name="MEDRANO ESCRIG, AITOR" userId="0d3502aa-7666-4142-bea3-4e942ac6c91d" providerId="ADAL" clId="{75DD5463-8147-4F71-B6BC-989CA61CC403}" dt="2024-08-08T18:48:20.597" v="85" actId="478"/>
+          <ac:cxnSpMkLst>
+            <pc:docMk/>
+            <pc:sldMk cId="1153971177" sldId="257"/>
+            <ac:cxnSpMk id="25" creationId="{8D2D99D5-9BC8-5ED4-5887-22AB227F6A09}"/>
+          </ac:cxnSpMkLst>
+        </pc:cxnChg>
+        <pc:cxnChg chg="del">
+          <ac:chgData name="MEDRANO ESCRIG, AITOR" userId="0d3502aa-7666-4142-bea3-4e942ac6c91d" providerId="ADAL" clId="{75DD5463-8147-4F71-B6BC-989CA61CC403}" dt="2024-08-08T18:48:20.597" v="85" actId="478"/>
+          <ac:cxnSpMkLst>
+            <pc:docMk/>
+            <pc:sldMk cId="1153971177" sldId="257"/>
+            <ac:cxnSpMk id="26" creationId="{ED37823B-4E7D-8EB1-4E1E-658E98FF3159}"/>
+          </ac:cxnSpMkLst>
+        </pc:cxnChg>
+        <pc:cxnChg chg="del">
+          <ac:chgData name="MEDRANO ESCRIG, AITOR" userId="0d3502aa-7666-4142-bea3-4e942ac6c91d" providerId="ADAL" clId="{75DD5463-8147-4F71-B6BC-989CA61CC403}" dt="2024-08-08T18:48:20.597" v="85" actId="478"/>
+          <ac:cxnSpMkLst>
+            <pc:docMk/>
+            <pc:sldMk cId="1153971177" sldId="257"/>
+            <ac:cxnSpMk id="28" creationId="{C299019E-365E-70BA-6D58-3C1344F1493F}"/>
+          </ac:cxnSpMkLst>
+        </pc:cxnChg>
+        <pc:cxnChg chg="del">
+          <ac:chgData name="MEDRANO ESCRIG, AITOR" userId="0d3502aa-7666-4142-bea3-4e942ac6c91d" providerId="ADAL" clId="{75DD5463-8147-4F71-B6BC-989CA61CC403}" dt="2024-08-08T18:48:20.597" v="85" actId="478"/>
+          <ac:cxnSpMkLst>
+            <pc:docMk/>
+            <pc:sldMk cId="1153971177" sldId="257"/>
+            <ac:cxnSpMk id="29" creationId="{86440354-F788-AE7A-B6C5-CBB3B2C5E229}"/>
+          </ac:cxnSpMkLst>
+        </pc:cxnChg>
+        <pc:cxnChg chg="del">
+          <ac:chgData name="MEDRANO ESCRIG, AITOR" userId="0d3502aa-7666-4142-bea3-4e942ac6c91d" providerId="ADAL" clId="{75DD5463-8147-4F71-B6BC-989CA61CC403}" dt="2024-08-08T18:48:20.597" v="85" actId="478"/>
+          <ac:cxnSpMkLst>
+            <pc:docMk/>
+            <pc:sldMk cId="1153971177" sldId="257"/>
+            <ac:cxnSpMk id="33" creationId="{C753CFE3-9B5D-4580-6B9A-BB4E5A6E571F}"/>
+          </ac:cxnSpMkLst>
+        </pc:cxnChg>
+      </pc:sldChg>
+    </pc:docChg>
+  </pc:docChgLst>
+</pc:chgInfo>
 </file>
 
 <file path=ppt/slideLayouts/slideLayout1.xml><?xml version="1.0" encoding="utf-8"?>
@@ -264,7 +411,7 @@
           <a:p>
             <a:fld id="{9ECA1AE0-D2A3-2446-8EEA-E972E77345DB}" type="datetimeFigureOut">
               <a:rPr lang="es-ES_tradnl" smtClean="0"/>
-              <a:t>5/8/24</a:t>
+              <a:t>08/08/2024</a:t>
             </a:fld>
             <a:endParaRPr lang="es-ES_tradnl"/>
           </a:p>
@@ -318,7 +465,7 @@
           <a:p>
             <a:fld id="{1EED570D-C3DA-C44C-8E70-302E7A5DF57B}" type="slidenum">
               <a:rPr lang="es-ES_tradnl" smtClean="0"/>
-              <a:t>‹Nº›</a:t>
+              <a:t>‹#›</a:t>
             </a:fld>
             <a:endParaRPr lang="es-ES_tradnl"/>
           </a:p>
@@ -464,7 +611,7 @@
           <a:p>
             <a:fld id="{9ECA1AE0-D2A3-2446-8EEA-E972E77345DB}" type="datetimeFigureOut">
               <a:rPr lang="es-ES_tradnl" smtClean="0"/>
-              <a:t>5/8/24</a:t>
+              <a:t>08/08/2024</a:t>
             </a:fld>
             <a:endParaRPr lang="es-ES_tradnl"/>
           </a:p>
@@ -518,7 +665,7 @@
           <a:p>
             <a:fld id="{1EED570D-C3DA-C44C-8E70-302E7A5DF57B}" type="slidenum">
               <a:rPr lang="es-ES_tradnl" smtClean="0"/>
-              <a:t>‹Nº›</a:t>
+              <a:t>‹#›</a:t>
             </a:fld>
             <a:endParaRPr lang="es-ES_tradnl"/>
           </a:p>
@@ -674,7 +821,7 @@
           <a:p>
             <a:fld id="{9ECA1AE0-D2A3-2446-8EEA-E972E77345DB}" type="datetimeFigureOut">
               <a:rPr lang="es-ES_tradnl" smtClean="0"/>
-              <a:t>5/8/24</a:t>
+              <a:t>08/08/2024</a:t>
             </a:fld>
             <a:endParaRPr lang="es-ES_tradnl"/>
           </a:p>
@@ -728,7 +875,7 @@
           <a:p>
             <a:fld id="{1EED570D-C3DA-C44C-8E70-302E7A5DF57B}" type="slidenum">
               <a:rPr lang="es-ES_tradnl" smtClean="0"/>
-              <a:t>‹Nº›</a:t>
+              <a:t>‹#›</a:t>
             </a:fld>
             <a:endParaRPr lang="es-ES_tradnl"/>
           </a:p>
@@ -874,7 +1021,7 @@
           <a:p>
             <a:fld id="{9ECA1AE0-D2A3-2446-8EEA-E972E77345DB}" type="datetimeFigureOut">
               <a:rPr lang="es-ES_tradnl" smtClean="0"/>
-              <a:t>5/8/24</a:t>
+              <a:t>08/08/2024</a:t>
             </a:fld>
             <a:endParaRPr lang="es-ES_tradnl"/>
           </a:p>
@@ -928,7 +1075,7 @@
           <a:p>
             <a:fld id="{1EED570D-C3DA-C44C-8E70-302E7A5DF57B}" type="slidenum">
               <a:rPr lang="es-ES_tradnl" smtClean="0"/>
-              <a:t>‹Nº›</a:t>
+              <a:t>‹#›</a:t>
             </a:fld>
             <a:endParaRPr lang="es-ES_tradnl"/>
           </a:p>
@@ -1150,7 +1297,7 @@
           <a:p>
             <a:fld id="{9ECA1AE0-D2A3-2446-8EEA-E972E77345DB}" type="datetimeFigureOut">
               <a:rPr lang="es-ES_tradnl" smtClean="0"/>
-              <a:t>5/8/24</a:t>
+              <a:t>08/08/2024</a:t>
             </a:fld>
             <a:endParaRPr lang="es-ES_tradnl"/>
           </a:p>
@@ -1204,7 +1351,7 @@
           <a:p>
             <a:fld id="{1EED570D-C3DA-C44C-8E70-302E7A5DF57B}" type="slidenum">
               <a:rPr lang="es-ES_tradnl" smtClean="0"/>
-              <a:t>‹Nº›</a:t>
+              <a:t>‹#›</a:t>
             </a:fld>
             <a:endParaRPr lang="es-ES_tradnl"/>
           </a:p>
@@ -1418,7 +1565,7 @@
           <a:p>
             <a:fld id="{9ECA1AE0-D2A3-2446-8EEA-E972E77345DB}" type="datetimeFigureOut">
               <a:rPr lang="es-ES_tradnl" smtClean="0"/>
-              <a:t>5/8/24</a:t>
+              <a:t>08/08/2024</a:t>
             </a:fld>
             <a:endParaRPr lang="es-ES_tradnl"/>
           </a:p>
@@ -1472,7 +1619,7 @@
           <a:p>
             <a:fld id="{1EED570D-C3DA-C44C-8E70-302E7A5DF57B}" type="slidenum">
               <a:rPr lang="es-ES_tradnl" smtClean="0"/>
-              <a:t>‹Nº›</a:t>
+              <a:t>‹#›</a:t>
             </a:fld>
             <a:endParaRPr lang="es-ES_tradnl"/>
           </a:p>
@@ -1833,7 +1980,7 @@
           <a:p>
             <a:fld id="{9ECA1AE0-D2A3-2446-8EEA-E972E77345DB}" type="datetimeFigureOut">
               <a:rPr lang="es-ES_tradnl" smtClean="0"/>
-              <a:t>5/8/24</a:t>
+              <a:t>08/08/2024</a:t>
             </a:fld>
             <a:endParaRPr lang="es-ES_tradnl"/>
           </a:p>
@@ -1887,7 +2034,7 @@
           <a:p>
             <a:fld id="{1EED570D-C3DA-C44C-8E70-302E7A5DF57B}" type="slidenum">
               <a:rPr lang="es-ES_tradnl" smtClean="0"/>
-              <a:t>‹Nº›</a:t>
+              <a:t>‹#›</a:t>
             </a:fld>
             <a:endParaRPr lang="es-ES_tradnl"/>
           </a:p>
@@ -1975,7 +2122,7 @@
           <a:p>
             <a:fld id="{9ECA1AE0-D2A3-2446-8EEA-E972E77345DB}" type="datetimeFigureOut">
               <a:rPr lang="es-ES_tradnl" smtClean="0"/>
-              <a:t>5/8/24</a:t>
+              <a:t>08/08/2024</a:t>
             </a:fld>
             <a:endParaRPr lang="es-ES_tradnl"/>
           </a:p>
@@ -2029,7 +2176,7 @@
           <a:p>
             <a:fld id="{1EED570D-C3DA-C44C-8E70-302E7A5DF57B}" type="slidenum">
               <a:rPr lang="es-ES_tradnl" smtClean="0"/>
-              <a:t>‹Nº›</a:t>
+              <a:t>‹#›</a:t>
             </a:fld>
             <a:endParaRPr lang="es-ES_tradnl"/>
           </a:p>
@@ -2088,7 +2235,7 @@
           <a:p>
             <a:fld id="{9ECA1AE0-D2A3-2446-8EEA-E972E77345DB}" type="datetimeFigureOut">
               <a:rPr lang="es-ES_tradnl" smtClean="0"/>
-              <a:t>5/8/24</a:t>
+              <a:t>08/08/2024</a:t>
             </a:fld>
             <a:endParaRPr lang="es-ES_tradnl"/>
           </a:p>
@@ -2142,7 +2289,7 @@
           <a:p>
             <a:fld id="{1EED570D-C3DA-C44C-8E70-302E7A5DF57B}" type="slidenum">
               <a:rPr lang="es-ES_tradnl" smtClean="0"/>
-              <a:t>‹Nº›</a:t>
+              <a:t>‹#›</a:t>
             </a:fld>
             <a:endParaRPr lang="es-ES_tradnl"/>
           </a:p>
@@ -2401,7 +2548,7 @@
           <a:p>
             <a:fld id="{9ECA1AE0-D2A3-2446-8EEA-E972E77345DB}" type="datetimeFigureOut">
               <a:rPr lang="es-ES_tradnl" smtClean="0"/>
-              <a:t>5/8/24</a:t>
+              <a:t>08/08/2024</a:t>
             </a:fld>
             <a:endParaRPr lang="es-ES_tradnl"/>
           </a:p>
@@ -2455,7 +2602,7 @@
           <a:p>
             <a:fld id="{1EED570D-C3DA-C44C-8E70-302E7A5DF57B}" type="slidenum">
               <a:rPr lang="es-ES_tradnl" smtClean="0"/>
-              <a:t>‹Nº›</a:t>
+              <a:t>‹#›</a:t>
             </a:fld>
             <a:endParaRPr lang="es-ES_tradnl"/>
           </a:p>
@@ -2690,7 +2837,7 @@
           <a:p>
             <a:fld id="{9ECA1AE0-D2A3-2446-8EEA-E972E77345DB}" type="datetimeFigureOut">
               <a:rPr lang="es-ES_tradnl" smtClean="0"/>
-              <a:t>5/8/24</a:t>
+              <a:t>08/08/2024</a:t>
             </a:fld>
             <a:endParaRPr lang="es-ES_tradnl"/>
           </a:p>
@@ -2744,7 +2891,7 @@
           <a:p>
             <a:fld id="{1EED570D-C3DA-C44C-8E70-302E7A5DF57B}" type="slidenum">
               <a:rPr lang="es-ES_tradnl" smtClean="0"/>
-              <a:t>‹Nº›</a:t>
+              <a:t>‹#›</a:t>
             </a:fld>
             <a:endParaRPr lang="es-ES_tradnl"/>
           </a:p>
@@ -2933,7 +3080,7 @@
           <a:p>
             <a:fld id="{9ECA1AE0-D2A3-2446-8EEA-E972E77345DB}" type="datetimeFigureOut">
               <a:rPr lang="es-ES_tradnl" smtClean="0"/>
-              <a:t>5/8/24</a:t>
+              <a:t>08/08/2024</a:t>
             </a:fld>
             <a:endParaRPr lang="es-ES_tradnl"/>
           </a:p>
@@ -3023,7 +3170,7 @@
           <a:p>
             <a:fld id="{1EED570D-C3DA-C44C-8E70-302E7A5DF57B}" type="slidenum">
               <a:rPr lang="es-ES_tradnl" smtClean="0"/>
-              <a:t>‹Nº›</a:t>
+              <a:t>‹#›</a:t>
             </a:fld>
             <a:endParaRPr lang="es-ES_tradnl"/>
           </a:p>
@@ -3414,56 +3561,56 @@
             <a:p>
               <a:pPr algn="ctr"/>
               <a:r>
-                <a:rPr lang="es-ES_tradnl" dirty="0"/>
+                <a:rPr lang="es-ES_tradnl"/>
                 <a:t>Juan</a:t>
               </a:r>
             </a:p>
             <a:p>
               <a:pPr algn="ctr"/>
               <a:r>
-                <a:rPr lang="es-ES_tradnl" dirty="0"/>
+                <a:rPr lang="es-ES_tradnl"/>
                 <a:t>María</a:t>
               </a:r>
             </a:p>
             <a:p>
               <a:pPr algn="ctr"/>
               <a:r>
-                <a:rPr lang="es-ES_tradnl" dirty="0"/>
+                <a:rPr lang="es-ES_tradnl"/>
                 <a:t>Laura</a:t>
               </a:r>
             </a:p>
             <a:p>
               <a:pPr algn="ctr"/>
               <a:r>
-                <a:rPr lang="es-ES_tradnl" dirty="0"/>
+                <a:rPr lang="es-ES_tradnl"/>
                 <a:t>Antonio</a:t>
               </a:r>
             </a:p>
             <a:p>
               <a:pPr algn="ctr"/>
               <a:r>
-                <a:rPr lang="es-ES_tradnl" dirty="0"/>
+                <a:rPr lang="es-ES_tradnl"/>
                 <a:t>Pedro</a:t>
               </a:r>
             </a:p>
             <a:p>
               <a:pPr algn="ctr"/>
               <a:r>
-                <a:rPr lang="es-ES_tradnl" dirty="0"/>
+                <a:rPr lang="es-ES_tradnl"/>
                 <a:t>Aitor</a:t>
               </a:r>
             </a:p>
             <a:p>
               <a:pPr algn="ctr"/>
               <a:r>
-                <a:rPr lang="es-ES_tradnl" dirty="0"/>
+                <a:rPr lang="es-ES_tradnl"/>
                 <a:t>Marina</a:t>
               </a:r>
             </a:p>
             <a:p>
               <a:pPr algn="ctr"/>
               <a:r>
-                <a:rPr lang="es-ES_tradnl" dirty="0"/>
+                <a:rPr lang="es-ES_tradnl"/>
                 <a:t>Andreu</a:t>
               </a:r>
             </a:p>
@@ -3513,35 +3660,35 @@
             <a:p>
               <a:pPr algn="ctr"/>
               <a:r>
-                <a:rPr lang="es-ES_tradnl" dirty="0"/>
+                <a:rPr lang="es-ES_tradnl"/>
                 <a:t>Ventas</a:t>
               </a:r>
             </a:p>
             <a:p>
               <a:pPr algn="ctr"/>
               <a:r>
-                <a:rPr lang="es-ES_tradnl" dirty="0"/>
+                <a:rPr lang="es-ES_tradnl"/>
                 <a:t>Almacén</a:t>
               </a:r>
             </a:p>
             <a:p>
               <a:pPr algn="ctr"/>
               <a:r>
-                <a:rPr lang="es-ES_tradnl" dirty="0"/>
+                <a:rPr lang="es-ES_tradnl"/>
                 <a:t>TIC</a:t>
               </a:r>
             </a:p>
             <a:p>
               <a:pPr algn="ctr"/>
               <a:r>
-                <a:rPr lang="es-ES_tradnl" dirty="0"/>
+                <a:rPr lang="es-ES_tradnl"/>
                 <a:t>RRHH</a:t>
               </a:r>
             </a:p>
             <a:p>
               <a:pPr algn="ctr"/>
               <a:r>
-                <a:rPr lang="es-ES_tradnl" dirty="0"/>
+                <a:rPr lang="es-ES_tradnl"/>
                 <a:t>Dirección</a:t>
               </a:r>
             </a:p>
@@ -3780,35 +3927,35 @@
           <a:p>
             <a:pPr algn="ctr"/>
             <a:r>
-              <a:rPr lang="es-ES_tradnl" dirty="0"/>
+              <a:rPr lang="es-ES_tradnl"/>
               <a:t>PS5</a:t>
             </a:r>
           </a:p>
           <a:p>
             <a:pPr algn="ctr"/>
             <a:r>
-              <a:rPr lang="es-ES_tradnl" dirty="0"/>
+              <a:rPr lang="es-ES_tradnl"/>
               <a:t>Nevera</a:t>
             </a:r>
           </a:p>
           <a:p>
             <a:pPr algn="ctr"/>
             <a:r>
-              <a:rPr lang="es-ES_tradnl" dirty="0"/>
+              <a:rPr lang="es-ES_tradnl"/>
               <a:t>Teclado</a:t>
             </a:r>
           </a:p>
           <a:p>
             <a:pPr algn="ctr"/>
             <a:r>
-              <a:rPr lang="es-ES_tradnl" dirty="0"/>
+              <a:rPr lang="es-ES_tradnl"/>
               <a:t>XBOX</a:t>
             </a:r>
           </a:p>
           <a:p>
             <a:pPr algn="ctr"/>
             <a:r>
-              <a:rPr lang="es-ES_tradnl" dirty="0"/>
+              <a:rPr lang="es-ES_tradnl"/>
               <a:t>Ratón</a:t>
             </a:r>
           </a:p>
@@ -3858,40 +4005,40 @@
           <a:p>
             <a:pPr algn="ctr"/>
             <a:r>
-              <a:rPr lang="es-ES_tradnl" dirty="0"/>
+              <a:rPr lang="es-ES_tradnl"/>
               <a:t>Consola</a:t>
             </a:r>
           </a:p>
           <a:p>
             <a:pPr algn="ctr"/>
-            <a:endParaRPr lang="es-ES_tradnl" dirty="0"/>
+            <a:endParaRPr lang="es-ES_tradnl"/>
           </a:p>
           <a:p>
             <a:pPr algn="ctr"/>
             <a:r>
-              <a:rPr lang="es-ES_tradnl" dirty="0"/>
+              <a:rPr lang="es-ES_tradnl"/>
               <a:t>TIC</a:t>
             </a:r>
           </a:p>
           <a:p>
             <a:pPr algn="ctr"/>
-            <a:endParaRPr lang="es-ES_tradnl" dirty="0"/>
+            <a:endParaRPr lang="es-ES_tradnl"/>
           </a:p>
           <a:p>
             <a:pPr algn="ctr"/>
             <a:r>
-              <a:rPr lang="es-ES_tradnl" dirty="0"/>
+              <a:rPr lang="es-ES_tradnl"/>
               <a:t>Cocina</a:t>
             </a:r>
           </a:p>
           <a:p>
             <a:pPr algn="ctr"/>
-            <a:endParaRPr lang="es-ES_tradnl" dirty="0"/>
+            <a:endParaRPr lang="es-ES_tradnl"/>
           </a:p>
           <a:p>
             <a:pPr algn="ctr"/>
             <a:r>
-              <a:rPr lang="es-ES_tradnl" dirty="0"/>
+              <a:rPr lang="es-ES_tradnl"/>
               <a:t>Bricolaje</a:t>
             </a:r>
           </a:p>
@@ -4091,6 +4238,493 @@
     <p:extLst>
       <p:ext uri="{BB962C8B-B14F-4D97-AF65-F5344CB8AC3E}">
         <p14:creationId xmlns:p14="http://schemas.microsoft.com/office/powerpoint/2010/main" val="3957164704"/>
+      </p:ext>
+    </p:extLst>
+  </p:cSld>
+  <p:clrMapOvr>
+    <a:masterClrMapping/>
+  </p:clrMapOvr>
+</p:sld>
+</file>
+
+<file path=ppt/slides/slide2.xml><?xml version="1.0" encoding="utf-8"?>
+<p:sld xmlns:a="http://schemas.openxmlformats.org/drawingml/2006/main" xmlns:r="http://schemas.openxmlformats.org/officeDocument/2006/relationships" xmlns:p="http://schemas.openxmlformats.org/presentationml/2006/main">
+  <p:cSld>
+    <p:spTree>
+      <p:nvGrpSpPr>
+        <p:cNvPr id="1" name=""/>
+        <p:cNvGrpSpPr/>
+        <p:nvPr/>
+      </p:nvGrpSpPr>
+      <p:grpSpPr>
+        <a:xfrm>
+          <a:off x="0" y="0"/>
+          <a:ext cx="0" cy="0"/>
+          <a:chOff x="0" y="0"/>
+          <a:chExt cx="0" cy="0"/>
+        </a:xfrm>
+      </p:grpSpPr>
+      <p:grpSp>
+        <p:nvGrpSpPr>
+          <p:cNvPr id="30" name="Grupo 29">
+            <a:extLst>
+              <a:ext uri="{FF2B5EF4-FFF2-40B4-BE49-F238E27FC236}">
+                <a16:creationId xmlns:a16="http://schemas.microsoft.com/office/drawing/2014/main" id="{E529FA40-5305-4CEB-6FDA-124D8A42B380}"/>
+              </a:ext>
+            </a:extLst>
+          </p:cNvPr>
+          <p:cNvGrpSpPr/>
+          <p:nvPr/>
+        </p:nvGrpSpPr>
+        <p:grpSpPr>
+          <a:xfrm>
+            <a:off x="776979" y="1414575"/>
+            <a:ext cx="4715263" cy="2881424"/>
+            <a:chOff x="2157413" y="1733107"/>
+            <a:chExt cx="4715263" cy="2881424"/>
+          </a:xfrm>
+        </p:grpSpPr>
+        <p:sp>
+          <p:nvSpPr>
+            <p:cNvPr id="4" name="Elipse 3">
+              <a:extLst>
+                <a:ext uri="{FF2B5EF4-FFF2-40B4-BE49-F238E27FC236}">
+                  <a16:creationId xmlns:a16="http://schemas.microsoft.com/office/drawing/2014/main" id="{103879F7-78CF-3553-1207-757832A83FF6}"/>
+                </a:ext>
+              </a:extLst>
+            </p:cNvPr>
+            <p:cNvSpPr/>
+            <p:nvPr/>
+          </p:nvSpPr>
+          <p:spPr>
+            <a:xfrm>
+              <a:off x="2157413" y="1733107"/>
+              <a:ext cx="1680940" cy="2881423"/>
+            </a:xfrm>
+            <a:prstGeom prst="ellipse">
+              <a:avLst/>
+            </a:prstGeom>
+            <a:ln/>
+          </p:spPr>
+          <p:style>
+            <a:lnRef idx="2">
+              <a:schemeClr val="accent4">
+                <a:shade val="15000"/>
+              </a:schemeClr>
+            </a:lnRef>
+            <a:fillRef idx="1">
+              <a:schemeClr val="accent4"/>
+            </a:fillRef>
+            <a:effectRef idx="0">
+              <a:schemeClr val="accent4"/>
+            </a:effectRef>
+            <a:fontRef idx="minor">
+              <a:schemeClr val="lt1"/>
+            </a:fontRef>
+          </p:style>
+          <p:txBody>
+            <a:bodyPr rtlCol="0" anchor="ctr"/>
+            <a:lstStyle/>
+            <a:p>
+              <a:pPr algn="ctr"/>
+              <a:r>
+                <a:rPr lang="es-ES_tradnl"/>
+                <a:t>Juan</a:t>
+              </a:r>
+            </a:p>
+            <a:p>
+              <a:pPr algn="ctr"/>
+              <a:r>
+                <a:rPr lang="es-ES_tradnl"/>
+                <a:t>María</a:t>
+              </a:r>
+            </a:p>
+            <a:p>
+              <a:pPr algn="ctr"/>
+              <a:r>
+                <a:rPr lang="es-ES_tradnl"/>
+                <a:t>Laura</a:t>
+              </a:r>
+            </a:p>
+            <a:p>
+              <a:pPr algn="ctr"/>
+              <a:r>
+                <a:rPr lang="es-ES_tradnl"/>
+                <a:t>Antonio</a:t>
+              </a:r>
+            </a:p>
+            <a:p>
+              <a:pPr algn="ctr"/>
+              <a:r>
+                <a:rPr lang="es-ES_tradnl"/>
+                <a:t>Pedro</a:t>
+              </a:r>
+            </a:p>
+            <a:p>
+              <a:pPr algn="ctr"/>
+              <a:r>
+                <a:rPr lang="es-ES_tradnl"/>
+                <a:t>Aitor</a:t>
+              </a:r>
+            </a:p>
+            <a:p>
+              <a:pPr algn="ctr"/>
+              <a:r>
+                <a:rPr lang="es-ES_tradnl"/>
+                <a:t>Marina</a:t>
+              </a:r>
+            </a:p>
+            <a:p>
+              <a:pPr algn="ctr"/>
+              <a:r>
+                <a:rPr lang="es-ES_tradnl"/>
+                <a:t>Andreu</a:t>
+              </a:r>
+            </a:p>
+          </p:txBody>
+        </p:sp>
+        <p:sp>
+          <p:nvSpPr>
+            <p:cNvPr id="5" name="Elipse 4">
+              <a:extLst>
+                <a:ext uri="{FF2B5EF4-FFF2-40B4-BE49-F238E27FC236}">
+                  <a16:creationId xmlns:a16="http://schemas.microsoft.com/office/drawing/2014/main" id="{AA461F6F-3B2E-CD78-6478-868EAC0898F2}"/>
+                </a:ext>
+              </a:extLst>
+            </p:cNvPr>
+            <p:cNvSpPr/>
+            <p:nvPr/>
+          </p:nvSpPr>
+          <p:spPr>
+            <a:xfrm>
+              <a:off x="5191736" y="1733107"/>
+              <a:ext cx="1680940" cy="2881424"/>
+            </a:xfrm>
+            <a:prstGeom prst="ellipse">
+              <a:avLst/>
+            </a:prstGeom>
+            <a:ln/>
+          </p:spPr>
+          <p:style>
+            <a:lnRef idx="2">
+              <a:schemeClr val="accent4">
+                <a:shade val="15000"/>
+              </a:schemeClr>
+            </a:lnRef>
+            <a:fillRef idx="1">
+              <a:schemeClr val="accent4"/>
+            </a:fillRef>
+            <a:effectRef idx="0">
+              <a:schemeClr val="accent4"/>
+            </a:effectRef>
+            <a:fontRef idx="minor">
+              <a:schemeClr val="lt1"/>
+            </a:fontRef>
+          </p:style>
+          <p:txBody>
+            <a:bodyPr rtlCol="0" anchor="ctr"/>
+            <a:lstStyle/>
+            <a:p>
+              <a:pPr algn="ctr"/>
+              <a:r>
+                <a:rPr lang="es-ES_tradnl"/>
+                <a:t>Proy01</a:t>
+              </a:r>
+            </a:p>
+            <a:p>
+              <a:pPr algn="ctr"/>
+              <a:r>
+                <a:rPr lang="es-ES_tradnl"/>
+                <a:t>Proy02</a:t>
+              </a:r>
+            </a:p>
+            <a:p>
+              <a:pPr algn="ctr"/>
+              <a:r>
+                <a:rPr lang="es-ES_tradnl"/>
+                <a:t>Proy03</a:t>
+              </a:r>
+            </a:p>
+            <a:p>
+              <a:pPr algn="ctr"/>
+              <a:r>
+                <a:rPr lang="es-ES_tradnl"/>
+                <a:t>Proy04</a:t>
+              </a:r>
+            </a:p>
+          </p:txBody>
+        </p:sp>
+        <p:cxnSp>
+          <p:nvCxnSpPr>
+            <p:cNvPr id="7" name="Conector recto 6">
+              <a:extLst>
+                <a:ext uri="{FF2B5EF4-FFF2-40B4-BE49-F238E27FC236}">
+                  <a16:creationId xmlns:a16="http://schemas.microsoft.com/office/drawing/2014/main" id="{F4E49F37-9A66-5295-C6EA-FE3DE78A0CF3}"/>
+                </a:ext>
+              </a:extLst>
+            </p:cNvPr>
+            <p:cNvCxnSpPr>
+              <a:cxnSpLocks/>
+            </p:cNvCxnSpPr>
+            <p:nvPr/>
+          </p:nvCxnSpPr>
+          <p:spPr>
+            <a:xfrm>
+              <a:off x="3349256" y="2217775"/>
+              <a:ext cx="2324737" cy="539157"/>
+            </a:xfrm>
+            <a:prstGeom prst="line">
+              <a:avLst/>
+            </a:prstGeom>
+          </p:spPr>
+          <p:style>
+            <a:lnRef idx="2">
+              <a:schemeClr val="accent1"/>
+            </a:lnRef>
+            <a:fillRef idx="0">
+              <a:schemeClr val="accent1"/>
+            </a:fillRef>
+            <a:effectRef idx="1">
+              <a:schemeClr val="accent1"/>
+            </a:effectRef>
+            <a:fontRef idx="minor">
+              <a:schemeClr val="tx1"/>
+            </a:fontRef>
+          </p:style>
+        </p:cxnSp>
+        <p:cxnSp>
+          <p:nvCxnSpPr>
+            <p:cNvPr id="8" name="Conector recto 7">
+              <a:extLst>
+                <a:ext uri="{FF2B5EF4-FFF2-40B4-BE49-F238E27FC236}">
+                  <a16:creationId xmlns:a16="http://schemas.microsoft.com/office/drawing/2014/main" id="{EE24E5A2-AA3A-3645-7E1E-979644CE7DF4}"/>
+                </a:ext>
+              </a:extLst>
+            </p:cNvPr>
+            <p:cNvCxnSpPr>
+              <a:cxnSpLocks/>
+            </p:cNvCxnSpPr>
+            <p:nvPr/>
+          </p:nvCxnSpPr>
+          <p:spPr>
+            <a:xfrm>
+              <a:off x="3349256" y="3590706"/>
+              <a:ext cx="2324737" cy="21706"/>
+            </a:xfrm>
+            <a:prstGeom prst="line">
+              <a:avLst/>
+            </a:prstGeom>
+          </p:spPr>
+          <p:style>
+            <a:lnRef idx="2">
+              <a:schemeClr val="accent1"/>
+            </a:lnRef>
+            <a:fillRef idx="0">
+              <a:schemeClr val="accent1"/>
+            </a:fillRef>
+            <a:effectRef idx="1">
+              <a:schemeClr val="accent1"/>
+            </a:effectRef>
+            <a:fontRef idx="minor">
+              <a:schemeClr val="tx1"/>
+            </a:fontRef>
+          </p:style>
+        </p:cxnSp>
+        <p:cxnSp>
+          <p:nvCxnSpPr>
+            <p:cNvPr id="13" name="Conector recto 12">
+              <a:extLst>
+                <a:ext uri="{FF2B5EF4-FFF2-40B4-BE49-F238E27FC236}">
+                  <a16:creationId xmlns:a16="http://schemas.microsoft.com/office/drawing/2014/main" id="{9DA8E11B-06D9-C5A5-0417-AB8AD906CB12}"/>
+                </a:ext>
+              </a:extLst>
+            </p:cNvPr>
+            <p:cNvCxnSpPr>
+              <a:cxnSpLocks/>
+            </p:cNvCxnSpPr>
+            <p:nvPr/>
+          </p:nvCxnSpPr>
+          <p:spPr>
+            <a:xfrm flipV="1">
+              <a:off x="3409258" y="3394184"/>
+              <a:ext cx="2264735" cy="756944"/>
+            </a:xfrm>
+            <a:prstGeom prst="line">
+              <a:avLst/>
+            </a:prstGeom>
+          </p:spPr>
+          <p:style>
+            <a:lnRef idx="2">
+              <a:schemeClr val="accent1"/>
+            </a:lnRef>
+            <a:fillRef idx="0">
+              <a:schemeClr val="accent1"/>
+            </a:fillRef>
+            <a:effectRef idx="1">
+              <a:schemeClr val="accent1"/>
+            </a:effectRef>
+            <a:fontRef idx="minor">
+              <a:schemeClr val="tx1"/>
+            </a:fontRef>
+          </p:style>
+        </p:cxnSp>
+        <p:cxnSp>
+          <p:nvCxnSpPr>
+            <p:cNvPr id="16" name="Conector recto 15">
+              <a:extLst>
+                <a:ext uri="{FF2B5EF4-FFF2-40B4-BE49-F238E27FC236}">
+                  <a16:creationId xmlns:a16="http://schemas.microsoft.com/office/drawing/2014/main" id="{C68A7CF0-428A-404D-809B-6E419B0AE241}"/>
+                </a:ext>
+              </a:extLst>
+            </p:cNvPr>
+            <p:cNvCxnSpPr>
+              <a:cxnSpLocks/>
+            </p:cNvCxnSpPr>
+            <p:nvPr/>
+          </p:nvCxnSpPr>
+          <p:spPr>
+            <a:xfrm flipV="1">
+              <a:off x="3409258" y="2833132"/>
+              <a:ext cx="2264735" cy="490873"/>
+            </a:xfrm>
+            <a:prstGeom prst="line">
+              <a:avLst/>
+            </a:prstGeom>
+          </p:spPr>
+          <p:style>
+            <a:lnRef idx="2">
+              <a:schemeClr val="accent1"/>
+            </a:lnRef>
+            <a:fillRef idx="0">
+              <a:schemeClr val="accent1"/>
+            </a:fillRef>
+            <a:effectRef idx="1">
+              <a:schemeClr val="accent1"/>
+            </a:effectRef>
+            <a:fontRef idx="minor">
+              <a:schemeClr val="tx1"/>
+            </a:fontRef>
+          </p:style>
+        </p:cxnSp>
+        <p:cxnSp>
+          <p:nvCxnSpPr>
+            <p:cNvPr id="20" name="Conector recto 19">
+              <a:extLst>
+                <a:ext uri="{FF2B5EF4-FFF2-40B4-BE49-F238E27FC236}">
+                  <a16:creationId xmlns:a16="http://schemas.microsoft.com/office/drawing/2014/main" id="{40D67917-38FA-9550-391B-FA92B7DD0417}"/>
+                </a:ext>
+              </a:extLst>
+            </p:cNvPr>
+            <p:cNvCxnSpPr>
+              <a:cxnSpLocks/>
+            </p:cNvCxnSpPr>
+            <p:nvPr/>
+          </p:nvCxnSpPr>
+          <p:spPr>
+            <a:xfrm>
+              <a:off x="3409258" y="2768011"/>
+              <a:ext cx="2264735" cy="584419"/>
+            </a:xfrm>
+            <a:prstGeom prst="line">
+              <a:avLst/>
+            </a:prstGeom>
+          </p:spPr>
+          <p:style>
+            <a:lnRef idx="2">
+              <a:schemeClr val="accent1"/>
+            </a:lnRef>
+            <a:fillRef idx="0">
+              <a:schemeClr val="accent1"/>
+            </a:fillRef>
+            <a:effectRef idx="1">
+              <a:schemeClr val="accent1"/>
+            </a:effectRef>
+            <a:fontRef idx="minor">
+              <a:schemeClr val="tx1"/>
+            </a:fontRef>
+          </p:style>
+        </p:cxnSp>
+      </p:grpSp>
+      <p:cxnSp>
+        <p:nvCxnSpPr>
+          <p:cNvPr id="11" name="Conector recto 10">
+            <a:extLst>
+              <a:ext uri="{FF2B5EF4-FFF2-40B4-BE49-F238E27FC236}">
+                <a16:creationId xmlns:a16="http://schemas.microsoft.com/office/drawing/2014/main" id="{E86BBA03-3147-0FEF-7C39-7928AF905B3B}"/>
+              </a:ext>
+            </a:extLst>
+          </p:cNvPr>
+          <p:cNvCxnSpPr>
+            <a:cxnSpLocks/>
+          </p:cNvCxnSpPr>
+          <p:nvPr/>
+        </p:nvCxnSpPr>
+        <p:spPr>
+          <a:xfrm>
+            <a:off x="1968822" y="1899243"/>
+            <a:ext cx="2324737" cy="1106230"/>
+          </a:xfrm>
+          <a:prstGeom prst="line">
+            <a:avLst/>
+          </a:prstGeom>
+        </p:spPr>
+        <p:style>
+          <a:lnRef idx="2">
+            <a:schemeClr val="accent1"/>
+          </a:lnRef>
+          <a:fillRef idx="0">
+            <a:schemeClr val="accent1"/>
+          </a:fillRef>
+          <a:effectRef idx="1">
+            <a:schemeClr val="accent1"/>
+          </a:effectRef>
+          <a:fontRef idx="minor">
+            <a:schemeClr val="tx1"/>
+          </a:fontRef>
+        </p:style>
+      </p:cxnSp>
+      <p:cxnSp>
+        <p:nvCxnSpPr>
+          <p:cNvPr id="15" name="Conector recto 14">
+            <a:extLst>
+              <a:ext uri="{FF2B5EF4-FFF2-40B4-BE49-F238E27FC236}">
+                <a16:creationId xmlns:a16="http://schemas.microsoft.com/office/drawing/2014/main" id="{D5A244D7-621E-8DEA-5390-5E69E3A51E7F}"/>
+              </a:ext>
+            </a:extLst>
+          </p:cNvPr>
+          <p:cNvCxnSpPr>
+            <a:cxnSpLocks/>
+          </p:cNvCxnSpPr>
+          <p:nvPr/>
+        </p:nvCxnSpPr>
+        <p:spPr>
+          <a:xfrm flipV="1">
+            <a:off x="2015509" y="2449479"/>
+            <a:ext cx="2278050" cy="1335123"/>
+          </a:xfrm>
+          <a:prstGeom prst="line">
+            <a:avLst/>
+          </a:prstGeom>
+        </p:spPr>
+        <p:style>
+          <a:lnRef idx="2">
+            <a:schemeClr val="accent1"/>
+          </a:lnRef>
+          <a:fillRef idx="0">
+            <a:schemeClr val="accent1"/>
+          </a:fillRef>
+          <a:effectRef idx="1">
+            <a:schemeClr val="accent1"/>
+          </a:effectRef>
+          <a:fontRef idx="minor">
+            <a:schemeClr val="tx1"/>
+          </a:fontRef>
+        </p:style>
+      </p:cxnSp>
+    </p:spTree>
+    <p:extLst>
+      <p:ext uri="{BB962C8B-B14F-4D97-AF65-F5344CB8AC3E}">
+        <p14:creationId xmlns:p14="http://schemas.microsoft.com/office/powerpoint/2010/main" val="1153971177"/>
       </p:ext>
     </p:extLst>
   </p:cSld>

</xml_diff>

<commit_message>
Deployed 641336a with MkDocs version: 1.6.0
</commit_message>
<xml_diff>
--- a/resources/graficosBD.pptx
+++ b/resources/graficosBD.pptx
@@ -7,6 +7,7 @@
   <p:sldIdLst>
     <p:sldId id="256" r:id="rId2"/>
     <p:sldId id="257" r:id="rId3"/>
+    <p:sldId id="261" r:id="rId4"/>
   </p:sldIdLst>
   <p:sldSz cx="12192000" cy="6858000"/>
   <p:notesSz cx="6858000" cy="9144000"/>
@@ -116,7 +117,7 @@
 <file path=ppt/revisionInfo.xml><?xml version="1.0" encoding="utf-8"?>
 <p1510:revInfo xmlns:a="http://schemas.openxmlformats.org/drawingml/2006/main" xmlns:r="http://schemas.openxmlformats.org/officeDocument/2006/relationships" xmlns:p1510="http://schemas.microsoft.com/office/powerpoint/2015/10/main">
   <p1510:revLst>
-    <p1510:client id="{75DD5463-8147-4F71-B6BC-989CA61CC403}" v="87" dt="2024-08-08T18:48:22.475"/>
+    <p1510:client id="{1C1A9418-01FF-EB43-B3B1-3FA2F3B7AF27}" v="4" dt="2024-08-19T15:25:54.264"/>
   </p1510:revLst>
 </p1510:revInfo>
 </file>
@@ -259,6 +260,83 @@
       </pc:sldChg>
     </pc:docChg>
   </pc:docChgLst>
+  <pc:docChgLst>
+    <pc:chgData name="MEDRANO ESCRIG, AITOR" userId="0d3502aa-7666-4142-bea3-4e942ac6c91d" providerId="ADAL" clId="{1C1A9418-01FF-EB43-B3B1-3FA2F3B7AF27}"/>
+    <pc:docChg chg="undo custSel addSld delSld modSld">
+      <pc:chgData name="MEDRANO ESCRIG, AITOR" userId="0d3502aa-7666-4142-bea3-4e942ac6c91d" providerId="ADAL" clId="{1C1A9418-01FF-EB43-B3B1-3FA2F3B7AF27}" dt="2024-08-19T15:27:47.324" v="49" actId="20577"/>
+      <pc:docMkLst>
+        <pc:docMk/>
+      </pc:docMkLst>
+      <pc:sldChg chg="addSp delSp modSp new del mod">
+        <pc:chgData name="MEDRANO ESCRIG, AITOR" userId="0d3502aa-7666-4142-bea3-4e942ac6c91d" providerId="ADAL" clId="{1C1A9418-01FF-EB43-B3B1-3FA2F3B7AF27}" dt="2024-08-19T15:26:04.473" v="26" actId="2696"/>
+        <pc:sldMkLst>
+          <pc:docMk/>
+          <pc:sldMk cId="3874715286" sldId="258"/>
+        </pc:sldMkLst>
+        <pc:spChg chg="add del mod">
+          <ac:chgData name="MEDRANO ESCRIG, AITOR" userId="0d3502aa-7666-4142-bea3-4e942ac6c91d" providerId="ADAL" clId="{1C1A9418-01FF-EB43-B3B1-3FA2F3B7AF27}" dt="2024-08-19T15:26:00.666" v="24" actId="478"/>
+          <ac:spMkLst>
+            <pc:docMk/>
+            <pc:sldMk cId="3874715286" sldId="258"/>
+            <ac:spMk id="3" creationId="{0DEFA389-777A-06DC-DC50-59B475949D3F}"/>
+          </ac:spMkLst>
+        </pc:spChg>
+        <pc:graphicFrameChg chg="add del mod modGraphic">
+          <ac:chgData name="MEDRANO ESCRIG, AITOR" userId="0d3502aa-7666-4142-bea3-4e942ac6c91d" providerId="ADAL" clId="{1C1A9418-01FF-EB43-B3B1-3FA2F3B7AF27}" dt="2024-08-19T15:25:25.876" v="18" actId="478"/>
+          <ac:graphicFrameMkLst>
+            <pc:docMk/>
+            <pc:sldMk cId="3874715286" sldId="258"/>
+            <ac:graphicFrameMk id="2" creationId="{66730958-A737-0166-73B3-A363F722A8DC}"/>
+          </ac:graphicFrameMkLst>
+        </pc:graphicFrameChg>
+      </pc:sldChg>
+      <pc:sldChg chg="new del">
+        <pc:chgData name="MEDRANO ESCRIG, AITOR" userId="0d3502aa-7666-4142-bea3-4e942ac6c91d" providerId="ADAL" clId="{1C1A9418-01FF-EB43-B3B1-3FA2F3B7AF27}" dt="2024-08-19T15:26:02.865" v="25" actId="2696"/>
+        <pc:sldMkLst>
+          <pc:docMk/>
+          <pc:sldMk cId="3605602465" sldId="259"/>
+        </pc:sldMkLst>
+      </pc:sldChg>
+      <pc:sldChg chg="delSp new del mod">
+        <pc:chgData name="MEDRANO ESCRIG, AITOR" userId="0d3502aa-7666-4142-bea3-4e942ac6c91d" providerId="ADAL" clId="{1C1A9418-01FF-EB43-B3B1-3FA2F3B7AF27}" dt="2024-08-19T15:26:23.710" v="28" actId="2696"/>
+        <pc:sldMkLst>
+          <pc:docMk/>
+          <pc:sldMk cId="2836919165" sldId="260"/>
+        </pc:sldMkLst>
+        <pc:spChg chg="del">
+          <ac:chgData name="MEDRANO ESCRIG, AITOR" userId="0d3502aa-7666-4142-bea3-4e942ac6c91d" providerId="ADAL" clId="{1C1A9418-01FF-EB43-B3B1-3FA2F3B7AF27}" dt="2024-08-19T15:25:39.870" v="21" actId="21"/>
+          <ac:spMkLst>
+            <pc:docMk/>
+            <pc:sldMk cId="2836919165" sldId="260"/>
+            <ac:spMk id="3" creationId="{034638A6-1463-82A3-0255-72D23868BFA6}"/>
+          </ac:spMkLst>
+        </pc:spChg>
+        <pc:spChg chg="del">
+          <ac:chgData name="MEDRANO ESCRIG, AITOR" userId="0d3502aa-7666-4142-bea3-4e942ac6c91d" providerId="ADAL" clId="{1C1A9418-01FF-EB43-B3B1-3FA2F3B7AF27}" dt="2024-08-19T15:25:44.429" v="22" actId="21"/>
+          <ac:spMkLst>
+            <pc:docMk/>
+            <pc:sldMk cId="2836919165" sldId="260"/>
+            <ac:spMk id="4" creationId="{D66E86FC-7FAE-6890-C9F9-43D0833AEF97}"/>
+          </ac:spMkLst>
+        </pc:spChg>
+      </pc:sldChg>
+      <pc:sldChg chg="modSp new mod">
+        <pc:chgData name="MEDRANO ESCRIG, AITOR" userId="0d3502aa-7666-4142-bea3-4e942ac6c91d" providerId="ADAL" clId="{1C1A9418-01FF-EB43-B3B1-3FA2F3B7AF27}" dt="2024-08-19T15:27:47.324" v="49" actId="20577"/>
+        <pc:sldMkLst>
+          <pc:docMk/>
+          <pc:sldMk cId="1605562311" sldId="261"/>
+        </pc:sldMkLst>
+        <pc:spChg chg="mod">
+          <ac:chgData name="MEDRANO ESCRIG, AITOR" userId="0d3502aa-7666-4142-bea3-4e942ac6c91d" providerId="ADAL" clId="{1C1A9418-01FF-EB43-B3B1-3FA2F3B7AF27}" dt="2024-08-19T15:27:47.324" v="49" actId="20577"/>
+          <ac:spMkLst>
+            <pc:docMk/>
+            <pc:sldMk cId="1605562311" sldId="261"/>
+            <ac:spMk id="3" creationId="{33EE4142-6A54-96B9-6409-1C787800FAA8}"/>
+          </ac:spMkLst>
+        </pc:spChg>
+      </pc:sldChg>
+    </pc:docChg>
+  </pc:docChgLst>
 </pc:chgInfo>
 </file>
 
@@ -411,7 +489,7 @@
           <a:p>
             <a:fld id="{9ECA1AE0-D2A3-2446-8EEA-E972E77345DB}" type="datetimeFigureOut">
               <a:rPr lang="es-ES_tradnl" smtClean="0"/>
-              <a:t>08/08/2024</a:t>
+              <a:t>19/8/24</a:t>
             </a:fld>
             <a:endParaRPr lang="es-ES_tradnl"/>
           </a:p>
@@ -465,7 +543,7 @@
           <a:p>
             <a:fld id="{1EED570D-C3DA-C44C-8E70-302E7A5DF57B}" type="slidenum">
               <a:rPr lang="es-ES_tradnl" smtClean="0"/>
-              <a:t>‹#›</a:t>
+              <a:t>‹Nº›</a:t>
             </a:fld>
             <a:endParaRPr lang="es-ES_tradnl"/>
           </a:p>
@@ -611,7 +689,7 @@
           <a:p>
             <a:fld id="{9ECA1AE0-D2A3-2446-8EEA-E972E77345DB}" type="datetimeFigureOut">
               <a:rPr lang="es-ES_tradnl" smtClean="0"/>
-              <a:t>08/08/2024</a:t>
+              <a:t>19/8/24</a:t>
             </a:fld>
             <a:endParaRPr lang="es-ES_tradnl"/>
           </a:p>
@@ -665,7 +743,7 @@
           <a:p>
             <a:fld id="{1EED570D-C3DA-C44C-8E70-302E7A5DF57B}" type="slidenum">
               <a:rPr lang="es-ES_tradnl" smtClean="0"/>
-              <a:t>‹#›</a:t>
+              <a:t>‹Nº›</a:t>
             </a:fld>
             <a:endParaRPr lang="es-ES_tradnl"/>
           </a:p>
@@ -821,7 +899,7 @@
           <a:p>
             <a:fld id="{9ECA1AE0-D2A3-2446-8EEA-E972E77345DB}" type="datetimeFigureOut">
               <a:rPr lang="es-ES_tradnl" smtClean="0"/>
-              <a:t>08/08/2024</a:t>
+              <a:t>19/8/24</a:t>
             </a:fld>
             <a:endParaRPr lang="es-ES_tradnl"/>
           </a:p>
@@ -875,7 +953,7 @@
           <a:p>
             <a:fld id="{1EED570D-C3DA-C44C-8E70-302E7A5DF57B}" type="slidenum">
               <a:rPr lang="es-ES_tradnl" smtClean="0"/>
-              <a:t>‹#›</a:t>
+              <a:t>‹Nº›</a:t>
             </a:fld>
             <a:endParaRPr lang="es-ES_tradnl"/>
           </a:p>
@@ -1021,7 +1099,7 @@
           <a:p>
             <a:fld id="{9ECA1AE0-D2A3-2446-8EEA-E972E77345DB}" type="datetimeFigureOut">
               <a:rPr lang="es-ES_tradnl" smtClean="0"/>
-              <a:t>08/08/2024</a:t>
+              <a:t>19/8/24</a:t>
             </a:fld>
             <a:endParaRPr lang="es-ES_tradnl"/>
           </a:p>
@@ -1075,7 +1153,7 @@
           <a:p>
             <a:fld id="{1EED570D-C3DA-C44C-8E70-302E7A5DF57B}" type="slidenum">
               <a:rPr lang="es-ES_tradnl" smtClean="0"/>
-              <a:t>‹#›</a:t>
+              <a:t>‹Nº›</a:t>
             </a:fld>
             <a:endParaRPr lang="es-ES_tradnl"/>
           </a:p>
@@ -1297,7 +1375,7 @@
           <a:p>
             <a:fld id="{9ECA1AE0-D2A3-2446-8EEA-E972E77345DB}" type="datetimeFigureOut">
               <a:rPr lang="es-ES_tradnl" smtClean="0"/>
-              <a:t>08/08/2024</a:t>
+              <a:t>19/8/24</a:t>
             </a:fld>
             <a:endParaRPr lang="es-ES_tradnl"/>
           </a:p>
@@ -1351,7 +1429,7 @@
           <a:p>
             <a:fld id="{1EED570D-C3DA-C44C-8E70-302E7A5DF57B}" type="slidenum">
               <a:rPr lang="es-ES_tradnl" smtClean="0"/>
-              <a:t>‹#›</a:t>
+              <a:t>‹Nº›</a:t>
             </a:fld>
             <a:endParaRPr lang="es-ES_tradnl"/>
           </a:p>
@@ -1565,7 +1643,7 @@
           <a:p>
             <a:fld id="{9ECA1AE0-D2A3-2446-8EEA-E972E77345DB}" type="datetimeFigureOut">
               <a:rPr lang="es-ES_tradnl" smtClean="0"/>
-              <a:t>08/08/2024</a:t>
+              <a:t>19/8/24</a:t>
             </a:fld>
             <a:endParaRPr lang="es-ES_tradnl"/>
           </a:p>
@@ -1619,7 +1697,7 @@
           <a:p>
             <a:fld id="{1EED570D-C3DA-C44C-8E70-302E7A5DF57B}" type="slidenum">
               <a:rPr lang="es-ES_tradnl" smtClean="0"/>
-              <a:t>‹#›</a:t>
+              <a:t>‹Nº›</a:t>
             </a:fld>
             <a:endParaRPr lang="es-ES_tradnl"/>
           </a:p>
@@ -1980,7 +2058,7 @@
           <a:p>
             <a:fld id="{9ECA1AE0-D2A3-2446-8EEA-E972E77345DB}" type="datetimeFigureOut">
               <a:rPr lang="es-ES_tradnl" smtClean="0"/>
-              <a:t>08/08/2024</a:t>
+              <a:t>19/8/24</a:t>
             </a:fld>
             <a:endParaRPr lang="es-ES_tradnl"/>
           </a:p>
@@ -2034,7 +2112,7 @@
           <a:p>
             <a:fld id="{1EED570D-C3DA-C44C-8E70-302E7A5DF57B}" type="slidenum">
               <a:rPr lang="es-ES_tradnl" smtClean="0"/>
-              <a:t>‹#›</a:t>
+              <a:t>‹Nº›</a:t>
             </a:fld>
             <a:endParaRPr lang="es-ES_tradnl"/>
           </a:p>
@@ -2122,7 +2200,7 @@
           <a:p>
             <a:fld id="{9ECA1AE0-D2A3-2446-8EEA-E972E77345DB}" type="datetimeFigureOut">
               <a:rPr lang="es-ES_tradnl" smtClean="0"/>
-              <a:t>08/08/2024</a:t>
+              <a:t>19/8/24</a:t>
             </a:fld>
             <a:endParaRPr lang="es-ES_tradnl"/>
           </a:p>
@@ -2176,7 +2254,7 @@
           <a:p>
             <a:fld id="{1EED570D-C3DA-C44C-8E70-302E7A5DF57B}" type="slidenum">
               <a:rPr lang="es-ES_tradnl" smtClean="0"/>
-              <a:t>‹#›</a:t>
+              <a:t>‹Nº›</a:t>
             </a:fld>
             <a:endParaRPr lang="es-ES_tradnl"/>
           </a:p>
@@ -2235,7 +2313,7 @@
           <a:p>
             <a:fld id="{9ECA1AE0-D2A3-2446-8EEA-E972E77345DB}" type="datetimeFigureOut">
               <a:rPr lang="es-ES_tradnl" smtClean="0"/>
-              <a:t>08/08/2024</a:t>
+              <a:t>19/8/24</a:t>
             </a:fld>
             <a:endParaRPr lang="es-ES_tradnl"/>
           </a:p>
@@ -2289,7 +2367,7 @@
           <a:p>
             <a:fld id="{1EED570D-C3DA-C44C-8E70-302E7A5DF57B}" type="slidenum">
               <a:rPr lang="es-ES_tradnl" smtClean="0"/>
-              <a:t>‹#›</a:t>
+              <a:t>‹Nº›</a:t>
             </a:fld>
             <a:endParaRPr lang="es-ES_tradnl"/>
           </a:p>
@@ -2548,7 +2626,7 @@
           <a:p>
             <a:fld id="{9ECA1AE0-D2A3-2446-8EEA-E972E77345DB}" type="datetimeFigureOut">
               <a:rPr lang="es-ES_tradnl" smtClean="0"/>
-              <a:t>08/08/2024</a:t>
+              <a:t>19/8/24</a:t>
             </a:fld>
             <a:endParaRPr lang="es-ES_tradnl"/>
           </a:p>
@@ -2602,7 +2680,7 @@
           <a:p>
             <a:fld id="{1EED570D-C3DA-C44C-8E70-302E7A5DF57B}" type="slidenum">
               <a:rPr lang="es-ES_tradnl" smtClean="0"/>
-              <a:t>‹#›</a:t>
+              <a:t>‹Nº›</a:t>
             </a:fld>
             <a:endParaRPr lang="es-ES_tradnl"/>
           </a:p>
@@ -2837,7 +2915,7 @@
           <a:p>
             <a:fld id="{9ECA1AE0-D2A3-2446-8EEA-E972E77345DB}" type="datetimeFigureOut">
               <a:rPr lang="es-ES_tradnl" smtClean="0"/>
-              <a:t>08/08/2024</a:t>
+              <a:t>19/8/24</a:t>
             </a:fld>
             <a:endParaRPr lang="es-ES_tradnl"/>
           </a:p>
@@ -2891,7 +2969,7 @@
           <a:p>
             <a:fld id="{1EED570D-C3DA-C44C-8E70-302E7A5DF57B}" type="slidenum">
               <a:rPr lang="es-ES_tradnl" smtClean="0"/>
-              <a:t>‹#›</a:t>
+              <a:t>‹Nº›</a:t>
             </a:fld>
             <a:endParaRPr lang="es-ES_tradnl"/>
           </a:p>
@@ -3080,7 +3158,7 @@
           <a:p>
             <a:fld id="{9ECA1AE0-D2A3-2446-8EEA-E972E77345DB}" type="datetimeFigureOut">
               <a:rPr lang="es-ES_tradnl" smtClean="0"/>
-              <a:t>08/08/2024</a:t>
+              <a:t>19/8/24</a:t>
             </a:fld>
             <a:endParaRPr lang="es-ES_tradnl"/>
           </a:p>
@@ -3170,7 +3248,7 @@
           <a:p>
             <a:fld id="{1EED570D-C3DA-C44C-8E70-302E7A5DF57B}" type="slidenum">
               <a:rPr lang="es-ES_tradnl" smtClean="0"/>
-              <a:t>‹#›</a:t>
+              <a:t>‹Nº›</a:t>
             </a:fld>
             <a:endParaRPr lang="es-ES_tradnl"/>
           </a:p>
@@ -4734,6 +4812,97 @@
 </p:sld>
 </file>
 
+<file path=ppt/slides/slide3.xml><?xml version="1.0" encoding="utf-8"?>
+<p:sld xmlns:a="http://schemas.openxmlformats.org/drawingml/2006/main" xmlns:r="http://schemas.openxmlformats.org/officeDocument/2006/relationships" xmlns:p="http://schemas.openxmlformats.org/presentationml/2006/main">
+  <p:cSld>
+    <p:spTree>
+      <p:nvGrpSpPr>
+        <p:cNvPr id="1" name=""/>
+        <p:cNvGrpSpPr/>
+        <p:nvPr/>
+      </p:nvGrpSpPr>
+      <p:grpSpPr>
+        <a:xfrm>
+          <a:off x="0" y="0"/>
+          <a:ext cx="0" cy="0"/>
+          <a:chOff x="0" y="0"/>
+          <a:chExt cx="0" cy="0"/>
+        </a:xfrm>
+      </p:grpSpPr>
+      <p:sp>
+        <p:nvSpPr>
+          <p:cNvPr id="2" name="Título 1">
+            <a:extLst>
+              <a:ext uri="{FF2B5EF4-FFF2-40B4-BE49-F238E27FC236}">
+                <a16:creationId xmlns:a16="http://schemas.microsoft.com/office/drawing/2014/main" id="{B66FD903-9D02-82D8-167A-B7CC666E5357}"/>
+              </a:ext>
+            </a:extLst>
+          </p:cNvPr>
+          <p:cNvSpPr>
+            <a:spLocks noGrp="1"/>
+          </p:cNvSpPr>
+          <p:nvPr>
+            <p:ph type="title"/>
+          </p:nvPr>
+        </p:nvSpPr>
+        <p:spPr/>
+        <p:txBody>
+          <a:bodyPr/>
+          <a:lstStyle/>
+          <a:p>
+            <a:endParaRPr lang="es-ES_tradnl"/>
+          </a:p>
+        </p:txBody>
+      </p:sp>
+      <p:sp>
+        <p:nvSpPr>
+          <p:cNvPr id="3" name="Marcador de contenido 2">
+            <a:extLst>
+              <a:ext uri="{FF2B5EF4-FFF2-40B4-BE49-F238E27FC236}">
+                <a16:creationId xmlns:a16="http://schemas.microsoft.com/office/drawing/2014/main" id="{33EE4142-6A54-96B9-6409-1C787800FAA8}"/>
+              </a:ext>
+            </a:extLst>
+          </p:cNvPr>
+          <p:cNvSpPr>
+            <a:spLocks noGrp="1"/>
+          </p:cNvSpPr>
+          <p:nvPr>
+            <p:ph idx="1"/>
+          </p:nvPr>
+        </p:nvSpPr>
+        <p:spPr/>
+        <p:txBody>
+          <a:bodyPr/>
+          <a:lstStyle/>
+          <a:p>
+            <a:r>
+              <a:rPr lang="es-ES_tradnl" dirty="0"/>
+              <a:t>PERSONA(</a:t>
+            </a:r>
+            <a:r>
+              <a:rPr lang="es-ES_tradnl" dirty="0" err="1"/>
+              <a:t>nif</a:t>
+            </a:r>
+            <a:r>
+              <a:rPr lang="es-ES_tradnl" dirty="0"/>
+              <a:t>, nombre, </a:t>
+            </a:r>
+          </a:p>
+        </p:txBody>
+      </p:sp>
+    </p:spTree>
+    <p:extLst>
+      <p:ext uri="{BB962C8B-B14F-4D97-AF65-F5344CB8AC3E}">
+        <p14:creationId xmlns:p14="http://schemas.microsoft.com/office/powerpoint/2010/main" val="1605562311"/>
+      </p:ext>
+    </p:extLst>
+  </p:cSld>
+  <p:clrMapOvr>
+    <a:masterClrMapping/>
+  </p:clrMapOvr>
+</p:sld>
+</file>
+
 <file path=ppt/theme/theme1.xml><?xml version="1.0" encoding="utf-8"?>
 <a:theme xmlns:a="http://schemas.openxmlformats.org/drawingml/2006/main" name="Tema de Office">
   <a:themeElements>

</xml_diff>